<commit_message>
updated incorrect link paths
</commit_message>
<xml_diff>
--- a/6-Responsible Web Design/ResponsibleWebDesign.pptx
+++ b/6-Responsible Web Design/ResponsibleWebDesign.pptx
@@ -202,7 +202,7 @@
           <a:p>
             <a:fld id="{D1EA0DBE-4458-7349-8DB4-B45B1B6487F3}" type="datetimeFigureOut">
               <a:rPr lang="en-US" smtClean="0"/>
-              <a:t>1/9/2012</a:t>
+              <a:t>1/9/12</a:t>
             </a:fld>
             <a:endParaRPr lang="en-US"/>
           </a:p>
@@ -765,13 +765,13 @@
   <p:clrMapOvr>
     <a:masterClrMapping/>
   </p:clrMapOvr>
-  <p:transition>
+  <p:transition xmlns:p14="http://schemas.microsoft.com/office/powerpoint/2010/main">
     <p:fade/>
   </p:transition>
   <p:timing>
     <p:tnLst>
       <p:par>
-        <p:cTn id="1" dur="indefinite" restart="never" nodeType="tmRoot"/>
+        <p:cTn xmlns:p14="http://schemas.microsoft.com/office/powerpoint/2010/main" id="1" dur="indefinite" restart="never" nodeType="tmRoot"/>
       </p:par>
     </p:tnLst>
   </p:timing>
@@ -940,7 +940,7 @@
   <p:clrMapOvr>
     <a:masterClrMapping/>
   </p:clrMapOvr>
-  <p:transition>
+  <p:transition xmlns:p14="http://schemas.microsoft.com/office/powerpoint/2010/main">
     <p:fade/>
   </p:transition>
 </p:sldLayout>
@@ -1240,13 +1240,13 @@
   <p:clrMapOvr>
     <a:masterClrMapping/>
   </p:clrMapOvr>
-  <p:transition>
+  <p:transition xmlns:p14="http://schemas.microsoft.com/office/powerpoint/2010/main">
     <p:fade/>
   </p:transition>
   <p:timing>
     <p:tnLst>
       <p:par>
-        <p:cTn id="1" dur="indefinite" restart="never" nodeType="tmRoot"/>
+        <p:cTn xmlns:p14="http://schemas.microsoft.com/office/powerpoint/2010/main" id="1" dur="indefinite" restart="never" nodeType="tmRoot"/>
       </p:par>
     </p:tnLst>
   </p:timing>
@@ -1659,7 +1659,7 @@
   <p:clrMapOvr>
     <a:masterClrMapping/>
   </p:clrMapOvr>
-  <p:transition>
+  <p:transition xmlns:p14="http://schemas.microsoft.com/office/powerpoint/2010/main">
     <p:fade/>
   </p:transition>
 </p:sldLayout>
@@ -1719,13 +1719,13 @@
   <p:clrMapOvr>
     <a:masterClrMapping/>
   </p:clrMapOvr>
-  <p:transition>
+  <p:transition xmlns:p14="http://schemas.microsoft.com/office/powerpoint/2010/main">
     <p:fade/>
   </p:transition>
   <p:timing>
     <p:tnLst>
       <p:par>
-        <p:cTn id="1" dur="indefinite" restart="never" nodeType="tmRoot"/>
+        <p:cTn xmlns:p14="http://schemas.microsoft.com/office/powerpoint/2010/main" id="1" dur="indefinite" restart="never" nodeType="tmRoot"/>
       </p:par>
     </p:tnLst>
   </p:timing>
@@ -1759,7 +1759,7 @@
   <p:clrMapOvr>
     <a:masterClrMapping/>
   </p:clrMapOvr>
-  <p:transition>
+  <p:transition xmlns:p14="http://schemas.microsoft.com/office/powerpoint/2010/main">
     <p:fade/>
   </p:transition>
 </p:sldLayout>
@@ -1806,13 +1806,13 @@
   <p:clrMapOvr>
     <a:masterClrMapping/>
   </p:clrMapOvr>
-  <p:transition>
+  <p:transition xmlns:p14="http://schemas.microsoft.com/office/powerpoint/2010/main">
     <p:fade/>
   </p:transition>
   <p:timing>
     <p:tnLst>
       <p:par>
-        <p:cTn id="1" dur="indefinite" restart="never" nodeType="tmRoot"/>
+        <p:cTn xmlns:p14="http://schemas.microsoft.com/office/powerpoint/2010/main" id="1" dur="indefinite" restart="never" nodeType="tmRoot"/>
       </p:par>
     </p:tnLst>
   </p:timing>
@@ -1865,13 +1865,13 @@
   <p:clrMapOvr>
     <a:masterClrMapping/>
   </p:clrMapOvr>
-  <p:transition>
+  <p:transition xmlns:p14="http://schemas.microsoft.com/office/powerpoint/2010/main">
     <p:fade/>
   </p:transition>
   <p:timing>
     <p:tnLst>
       <p:par>
-        <p:cTn id="1" dur="indefinite" restart="never" nodeType="tmRoot"/>
+        <p:cTn xmlns:p14="http://schemas.microsoft.com/office/powerpoint/2010/main" id="1" dur="indefinite" restart="never" nodeType="tmRoot"/>
       </p:par>
     </p:tnLst>
   </p:timing>
@@ -2116,7 +2116,7 @@
   <p:clrMapOvr>
     <a:masterClrMapping/>
   </p:clrMapOvr>
-  <p:transition>
+  <p:transition xmlns:p14="http://schemas.microsoft.com/office/powerpoint/2010/main">
     <p:fade/>
   </p:transition>
 </p:sldLayout>
@@ -2412,7 +2412,7 @@
   <p:clrMapOvr>
     <a:masterClrMapping/>
   </p:clrMapOvr>
-  <p:transition>
+  <p:transition xmlns:p14="http://schemas.microsoft.com/office/powerpoint/2010/main">
     <p:fade/>
   </p:transition>
 </p:sldLayout>
@@ -2580,13 +2580,13 @@
   <p:clrMapOvr>
     <a:masterClrMapping/>
   </p:clrMapOvr>
-  <p:transition>
+  <p:transition xmlns:p14="http://schemas.microsoft.com/office/powerpoint/2010/main">
     <p:fade/>
   </p:transition>
   <p:timing>
     <p:tnLst>
       <p:par>
-        <p:cTn id="1" dur="indefinite" restart="never" nodeType="tmRoot"/>
+        <p:cTn xmlns:p14="http://schemas.microsoft.com/office/powerpoint/2010/main" id="1" dur="indefinite" restart="never" nodeType="tmRoot"/>
       </p:par>
     </p:tnLst>
   </p:timing>
@@ -2862,7 +2862,7 @@
   <p:clrMapOvr>
     <a:masterClrMapping/>
   </p:clrMapOvr>
-  <p:transition>
+  <p:transition xmlns:p14="http://schemas.microsoft.com/office/powerpoint/2010/main">
     <p:fade/>
   </p:transition>
 </p:sldLayout>
@@ -3035,13 +3035,13 @@
   <p:clrMapOvr>
     <a:masterClrMapping/>
   </p:clrMapOvr>
-  <p:transition>
+  <p:transition xmlns:p14="http://schemas.microsoft.com/office/powerpoint/2010/main">
     <p:fade/>
   </p:transition>
   <p:timing>
     <p:tnLst>
       <p:par>
-        <p:cTn id="1" dur="indefinite" restart="never" nodeType="tmRoot"/>
+        <p:cTn xmlns:p14="http://schemas.microsoft.com/office/powerpoint/2010/main" id="1" dur="indefinite" restart="never" nodeType="tmRoot"/>
       </p:par>
     </p:tnLst>
   </p:timing>
@@ -3259,13 +3259,13 @@
   <p:clrMapOvr>
     <a:masterClrMapping/>
   </p:clrMapOvr>
-  <p:transition>
+  <p:transition xmlns:p14="http://schemas.microsoft.com/office/powerpoint/2010/main">
     <p:fade/>
   </p:transition>
   <p:timing>
     <p:tnLst>
       <p:par>
-        <p:cTn id="1" dur="indefinite" restart="never" nodeType="tmRoot"/>
+        <p:cTn xmlns:p14="http://schemas.microsoft.com/office/powerpoint/2010/main" id="1" dur="indefinite" restart="never" nodeType="tmRoot"/>
       </p:par>
     </p:tnLst>
   </p:timing>
@@ -3483,13 +3483,13 @@
   <p:clrMapOvr>
     <a:masterClrMapping/>
   </p:clrMapOvr>
-  <p:transition>
+  <p:transition xmlns:p14="http://schemas.microsoft.com/office/powerpoint/2010/main">
     <p:fade/>
   </p:transition>
   <p:timing>
     <p:tnLst>
       <p:par>
-        <p:cTn id="1" dur="indefinite" restart="never" nodeType="tmRoot"/>
+        <p:cTn xmlns:p14="http://schemas.microsoft.com/office/powerpoint/2010/main" id="1" dur="indefinite" restart="never" nodeType="tmRoot"/>
       </p:par>
     </p:tnLst>
   </p:timing>
@@ -3765,7 +3765,7 @@
   <p:clrMapOvr>
     <a:masterClrMapping/>
   </p:clrMapOvr>
-  <p:transition>
+  <p:transition xmlns:p14="http://schemas.microsoft.com/office/powerpoint/2010/main">
     <p:fade/>
   </p:transition>
 </p:sldLayout>
@@ -4040,7 +4040,7 @@
   <p:clrMapOvr>
     <a:masterClrMapping/>
   </p:clrMapOvr>
-  <p:transition>
+  <p:transition xmlns:p14="http://schemas.microsoft.com/office/powerpoint/2010/main">
     <p:fade/>
   </p:transition>
 </p:sldLayout>
@@ -4315,7 +4315,7 @@
   <p:clrMapOvr>
     <a:masterClrMapping/>
   </p:clrMapOvr>
-  <p:transition>
+  <p:transition xmlns:p14="http://schemas.microsoft.com/office/powerpoint/2010/main">
     <p:fade/>
   </p:transition>
 </p:sldLayout>
@@ -4590,7 +4590,7 @@
   <p:clrMapOvr>
     <a:masterClrMapping/>
   </p:clrMapOvr>
-  <p:transition>
+  <p:transition xmlns:p14="http://schemas.microsoft.com/office/powerpoint/2010/main">
     <p:fade/>
   </p:transition>
 </p:sldLayout>
@@ -4865,7 +4865,7 @@
   <p:clrMapOvr>
     <a:masterClrMapping/>
   </p:clrMapOvr>
-  <p:transition>
+  <p:transition xmlns:p14="http://schemas.microsoft.com/office/powerpoint/2010/main">
     <p:fade/>
   </p:transition>
 </p:sldLayout>
@@ -5140,7 +5140,7 @@
   <p:clrMapOvr>
     <a:masterClrMapping/>
   </p:clrMapOvr>
-  <p:transition>
+  <p:transition xmlns:p14="http://schemas.microsoft.com/office/powerpoint/2010/main">
     <p:fade/>
   </p:transition>
 </p:sldLayout>
@@ -5262,7 +5262,7 @@
   <p:clrMapOvr>
     <a:masterClrMapping/>
   </p:clrMapOvr>
-  <p:transition>
+  <p:transition xmlns:p14="http://schemas.microsoft.com/office/powerpoint/2010/main">
     <p:fade/>
   </p:transition>
 </p:sldLayout>
@@ -5537,7 +5537,7 @@
   <p:clrMapOvr>
     <a:masterClrMapping/>
   </p:clrMapOvr>
-  <p:transition>
+  <p:transition xmlns:p14="http://schemas.microsoft.com/office/powerpoint/2010/main">
     <p:fade/>
   </p:transition>
 </p:sldLayout>
@@ -5714,7 +5714,7 @@
   <p:clrMapOvr>
     <a:masterClrMapping/>
   </p:clrMapOvr>
-  <p:transition>
+  <p:transition xmlns:p14="http://schemas.microsoft.com/office/powerpoint/2010/main">
     <p:fade/>
   </p:transition>
 </p:sldLayout>
@@ -5882,7 +5882,7 @@
   <p:clrMapOvr>
     <a:masterClrMapping/>
   </p:clrMapOvr>
-  <p:transition>
+  <p:transition xmlns:p14="http://schemas.microsoft.com/office/powerpoint/2010/main">
     <p:fade/>
   </p:transition>
 </p:sldLayout>
@@ -6182,13 +6182,13 @@
   <p:clrMapOvr>
     <a:masterClrMapping/>
   </p:clrMapOvr>
-  <p:transition>
+  <p:transition xmlns:p14="http://schemas.microsoft.com/office/powerpoint/2010/main">
     <p:fade/>
   </p:transition>
   <p:timing>
     <p:tnLst>
       <p:par>
-        <p:cTn id="1" dur="indefinite" restart="never" nodeType="tmRoot"/>
+        <p:cTn xmlns:p14="http://schemas.microsoft.com/office/powerpoint/2010/main" id="1" dur="indefinite" restart="never" nodeType="tmRoot"/>
       </p:par>
     </p:tnLst>
   </p:timing>
@@ -6601,7 +6601,7 @@
   <p:clrMapOvr>
     <a:masterClrMapping/>
   </p:clrMapOvr>
-  <p:transition>
+  <p:transition xmlns:p14="http://schemas.microsoft.com/office/powerpoint/2010/main">
     <p:fade/>
   </p:transition>
 </p:sldLayout>
@@ -6661,13 +6661,13 @@
   <p:clrMapOvr>
     <a:masterClrMapping/>
   </p:clrMapOvr>
-  <p:transition>
+  <p:transition xmlns:p14="http://schemas.microsoft.com/office/powerpoint/2010/main">
     <p:fade/>
   </p:transition>
   <p:timing>
     <p:tnLst>
       <p:par>
-        <p:cTn id="1" dur="indefinite" restart="never" nodeType="tmRoot"/>
+        <p:cTn xmlns:p14="http://schemas.microsoft.com/office/powerpoint/2010/main" id="1" dur="indefinite" restart="never" nodeType="tmRoot"/>
       </p:par>
     </p:tnLst>
   </p:timing>
@@ -6701,7 +6701,7 @@
   <p:clrMapOvr>
     <a:masterClrMapping/>
   </p:clrMapOvr>
-  <p:transition>
+  <p:transition xmlns:p14="http://schemas.microsoft.com/office/powerpoint/2010/main">
     <p:fade/>
   </p:transition>
 </p:sldLayout>
@@ -6748,13 +6748,13 @@
   <p:clrMapOvr>
     <a:masterClrMapping/>
   </p:clrMapOvr>
-  <p:transition>
+  <p:transition xmlns:p14="http://schemas.microsoft.com/office/powerpoint/2010/main">
     <p:fade/>
   </p:transition>
   <p:timing>
     <p:tnLst>
       <p:par>
-        <p:cTn id="1" dur="indefinite" restart="never" nodeType="tmRoot"/>
+        <p:cTn xmlns:p14="http://schemas.microsoft.com/office/powerpoint/2010/main" id="1" dur="indefinite" restart="never" nodeType="tmRoot"/>
       </p:par>
     </p:tnLst>
   </p:timing>
@@ -6807,13 +6807,13 @@
   <p:clrMapOvr>
     <a:masterClrMapping/>
   </p:clrMapOvr>
-  <p:transition>
+  <p:transition xmlns:p14="http://schemas.microsoft.com/office/powerpoint/2010/main">
     <p:fade/>
   </p:transition>
   <p:timing>
     <p:tnLst>
       <p:par>
-        <p:cTn id="1" dur="indefinite" restart="never" nodeType="tmRoot"/>
+        <p:cTn xmlns:p14="http://schemas.microsoft.com/office/powerpoint/2010/main" id="1" dur="indefinite" restart="never" nodeType="tmRoot"/>
       </p:par>
     </p:tnLst>
   </p:timing>
@@ -7058,7 +7058,7 @@
   <p:clrMapOvr>
     <a:masterClrMapping/>
   </p:clrMapOvr>
-  <p:transition>
+  <p:transition xmlns:p14="http://schemas.microsoft.com/office/powerpoint/2010/main">
     <p:fade/>
   </p:transition>
 </p:sldLayout>
@@ -7354,7 +7354,7 @@
   <p:clrMapOvr>
     <a:masterClrMapping/>
   </p:clrMapOvr>
-  <p:transition>
+  <p:transition xmlns:p14="http://schemas.microsoft.com/office/powerpoint/2010/main">
     <p:fade/>
   </p:transition>
 </p:sldLayout>
@@ -7629,7 +7629,7 @@
   <p:clrMapOvr>
     <a:masterClrMapping/>
   </p:clrMapOvr>
-  <p:transition>
+  <p:transition xmlns:p14="http://schemas.microsoft.com/office/powerpoint/2010/main">
     <p:fade/>
   </p:transition>
 </p:sldLayout>
@@ -7797,13 +7797,13 @@
   <p:clrMapOvr>
     <a:masterClrMapping/>
   </p:clrMapOvr>
-  <p:transition>
+  <p:transition xmlns:p14="http://schemas.microsoft.com/office/powerpoint/2010/main">
     <p:fade/>
   </p:transition>
   <p:timing>
     <p:tnLst>
       <p:par>
-        <p:cTn id="1" dur="indefinite" restart="never" nodeType="tmRoot"/>
+        <p:cTn xmlns:p14="http://schemas.microsoft.com/office/powerpoint/2010/main" id="1" dur="indefinite" restart="never" nodeType="tmRoot"/>
       </p:par>
     </p:tnLst>
   </p:timing>
@@ -7977,13 +7977,13 @@
   <p:clrMapOvr>
     <a:masterClrMapping/>
   </p:clrMapOvr>
-  <p:transition>
+  <p:transition xmlns:p14="http://schemas.microsoft.com/office/powerpoint/2010/main">
     <p:fade/>
   </p:transition>
   <p:timing>
     <p:tnLst>
       <p:par>
-        <p:cTn id="1" dur="indefinite" restart="never" nodeType="tmRoot"/>
+        <p:cTn xmlns:p14="http://schemas.microsoft.com/office/powerpoint/2010/main" id="1" dur="indefinite" restart="never" nodeType="tmRoot"/>
       </p:par>
     </p:tnLst>
   </p:timing>
@@ -8259,7 +8259,7 @@
   <p:clrMapOvr>
     <a:masterClrMapping/>
   </p:clrMapOvr>
-  <p:transition>
+  <p:transition xmlns:p14="http://schemas.microsoft.com/office/powerpoint/2010/main">
     <p:fade/>
   </p:transition>
 </p:sldLayout>
@@ -8534,7 +8534,7 @@
   <p:clrMapOvr>
     <a:masterClrMapping/>
   </p:clrMapOvr>
-  <p:transition>
+  <p:transition xmlns:p14="http://schemas.microsoft.com/office/powerpoint/2010/main">
     <p:fade/>
   </p:transition>
 </p:sldLayout>
@@ -8809,7 +8809,7 @@
   <p:clrMapOvr>
     <a:masterClrMapping/>
   </p:clrMapOvr>
-  <p:transition>
+  <p:transition xmlns:p14="http://schemas.microsoft.com/office/powerpoint/2010/main">
     <p:fade/>
   </p:transition>
 </p:sldLayout>
@@ -8931,7 +8931,7 @@
   <p:clrMapOvr>
     <a:masterClrMapping/>
   </p:clrMapOvr>
-  <p:transition>
+  <p:transition xmlns:p14="http://schemas.microsoft.com/office/powerpoint/2010/main">
     <p:fade/>
   </p:transition>
 </p:sldLayout>
@@ -9108,7 +9108,7 @@
   <p:clrMapOvr>
     <a:masterClrMapping/>
   </p:clrMapOvr>
-  <p:transition>
+  <p:transition xmlns:p14="http://schemas.microsoft.com/office/powerpoint/2010/main">
     <p:fade/>
   </p:transition>
 </p:sldLayout>
@@ -9269,13 +9269,13 @@
     <p:sldLayoutId id="2147483678" r:id="rId18"/>
     <p:sldLayoutId id="2147483679" r:id="rId19"/>
   </p:sldLayoutIdLst>
-  <p:transition>
+  <p:transition xmlns:p14="http://schemas.microsoft.com/office/powerpoint/2010/main">
     <p:fade/>
   </p:transition>
   <p:timing>
     <p:tnLst>
       <p:par>
-        <p:cTn id="1" dur="indefinite" restart="never" nodeType="tmRoot"/>
+        <p:cTn xmlns:p14="http://schemas.microsoft.com/office/powerpoint/2010/main" id="1" dur="indefinite" restart="never" nodeType="tmRoot"/>
       </p:par>
     </p:tnLst>
   </p:timing>
@@ -9756,13 +9756,13 @@
     <p:sldLayoutId id="2147483681" r:id="rId1"/>
     <p:sldLayoutId id="2147483704" r:id="rId2"/>
   </p:sldLayoutIdLst>
-  <p:transition>
+  <p:transition xmlns:p14="http://schemas.microsoft.com/office/powerpoint/2010/main">
     <p:fade/>
   </p:transition>
   <p:timing>
     <p:tnLst>
       <p:par>
-        <p:cTn id="1" dur="indefinite" restart="never" nodeType="tmRoot"/>
+        <p:cTn xmlns:p14="http://schemas.microsoft.com/office/powerpoint/2010/main" id="1" dur="indefinite" restart="never" nodeType="tmRoot"/>
       </p:par>
     </p:tnLst>
   </p:timing>
@@ -10238,13 +10238,13 @@
     <p:sldLayoutId id="2147483700" r:id="rId18"/>
     <p:sldLayoutId id="2147483701" r:id="rId19"/>
   </p:sldLayoutIdLst>
-  <p:transition>
+  <p:transition xmlns:p14="http://schemas.microsoft.com/office/powerpoint/2010/main">
     <p:fade/>
   </p:transition>
   <p:timing>
     <p:tnLst>
       <p:par>
-        <p:cTn id="1" dur="indefinite" restart="never" nodeType="tmRoot"/>
+        <p:cTn xmlns:p14="http://schemas.microsoft.com/office/powerpoint/2010/main" id="1" dur="indefinite" restart="never" nodeType="tmRoot"/>
       </p:par>
     </p:tnLst>
   </p:timing>
@@ -10724,13 +10724,13 @@
   <p:sldLayoutIdLst>
     <p:sldLayoutId id="2147483703" r:id="rId1"/>
   </p:sldLayoutIdLst>
-  <p:transition>
+  <p:transition xmlns:p14="http://schemas.microsoft.com/office/powerpoint/2010/main">
     <p:fade/>
   </p:transition>
   <p:timing>
     <p:tnLst>
       <p:par>
-        <p:cTn id="1" dur="indefinite" restart="never" nodeType="tmRoot"/>
+        <p:cTn xmlns:p14="http://schemas.microsoft.com/office/powerpoint/2010/main" id="1" dur="indefinite" restart="never" nodeType="tmRoot"/>
       </p:par>
     </p:tnLst>
   </p:timing>
@@ -11105,7 +11105,7 @@
                 <a:ea typeface="+mn-ea"/>
                 <a:cs typeface="Arial" charset="0"/>
               </a:rPr>
-              <a:t>HTML5 Core*</a:t>
+              <a:t>Responsible Web Design*</a:t>
             </a:r>
             <a:endParaRPr lang="en-US" dirty="0"/>
           </a:p>
@@ -11157,7 +11157,7 @@
   <p:clrMapOvr>
     <a:masterClrMapping/>
   </p:clrMapOvr>
-  <p:transition>
+  <p:transition xmlns:p14="http://schemas.microsoft.com/office/powerpoint/2010/main">
     <p:fade/>
   </p:transition>
 </p:sld>
@@ -11265,7 +11265,7 @@
   <p:clrMapOvr>
     <a:masterClrMapping/>
   </p:clrMapOvr>
-  <p:transition>
+  <p:transition xmlns:p14="http://schemas.microsoft.com/office/powerpoint/2010/main">
     <p:fade/>
   </p:transition>
 </p:sld>
@@ -11399,7 +11399,7 @@
   <p:clrMapOvr>
     <a:masterClrMapping/>
   </p:clrMapOvr>
-  <p:transition>
+  <p:transition xmlns:p14="http://schemas.microsoft.com/office/powerpoint/2010/main">
     <p:fade/>
   </p:transition>
 </p:sld>
@@ -11504,13 +11504,13 @@
   <p:clrMapOvr>
     <a:masterClrMapping/>
   </p:clrMapOvr>
-  <p:transition>
+  <p:transition xmlns:p14="http://schemas.microsoft.com/office/powerpoint/2010/main">
     <p:fade/>
   </p:transition>
   <p:timing>
     <p:tnLst>
       <p:par>
-        <p:cTn id="1" dur="indefinite" restart="never" nodeType="tmRoot"/>
+        <p:cTn xmlns:p14="http://schemas.microsoft.com/office/powerpoint/2010/main" id="1" dur="indefinite" restart="never" nodeType="tmRoot"/>
       </p:par>
     </p:tnLst>
   </p:timing>
@@ -11619,7 +11619,7 @@
   <p:clrMapOvr>
     <a:masterClrMapping/>
   </p:clrMapOvr>
-  <p:transition>
+  <p:transition xmlns:p14="http://schemas.microsoft.com/office/powerpoint/2010/main">
     <p:fade/>
   </p:transition>
 </p:sld>
@@ -11728,13 +11728,13 @@
   <p:clrMapOvr>
     <a:masterClrMapping/>
   </p:clrMapOvr>
-  <p:transition>
+  <p:transition xmlns:p14="http://schemas.microsoft.com/office/powerpoint/2010/main">
     <p:fade/>
   </p:transition>
   <p:timing>
     <p:tnLst>
       <p:par>
-        <p:cTn id="1" dur="indefinite" restart="never" nodeType="tmRoot"/>
+        <p:cTn xmlns:p14="http://schemas.microsoft.com/office/powerpoint/2010/main" id="1" dur="indefinite" restart="never" nodeType="tmRoot"/>
       </p:par>
     </p:tnLst>
   </p:timing>
@@ -12393,13 +12393,13 @@
   <p:clrMapOvr>
     <a:masterClrMapping/>
   </p:clrMapOvr>
-  <p:transition>
+  <p:transition xmlns:p14="http://schemas.microsoft.com/office/powerpoint/2010/main">
     <p:fade/>
   </p:transition>
   <p:timing>
     <p:tnLst>
       <p:par>
-        <p:cTn id="1" dur="indefinite" restart="never" nodeType="tmRoot"/>
+        <p:cTn xmlns:p14="http://schemas.microsoft.com/office/powerpoint/2010/main" id="1" dur="indefinite" restart="never" nodeType="tmRoot"/>
       </p:par>
     </p:tnLst>
   </p:timing>
@@ -12456,13 +12456,13 @@
   <p:clrMapOvr>
     <a:masterClrMapping/>
   </p:clrMapOvr>
-  <p:transition>
+  <p:transition xmlns:p14="http://schemas.microsoft.com/office/powerpoint/2010/main">
     <p:fade/>
   </p:transition>
   <p:timing>
     <p:tnLst>
       <p:par>
-        <p:cTn id="1" dur="indefinite" restart="never" nodeType="tmRoot"/>
+        <p:cTn xmlns:p14="http://schemas.microsoft.com/office/powerpoint/2010/main" id="1" dur="indefinite" restart="never" nodeType="tmRoot"/>
       </p:par>
     </p:tnLst>
   </p:timing>

</xml_diff>